<commit_message>
How to do HOC
1. Pass down the state to the subscribed component
2. Pass the handle to the top component.
</commit_message>
<xml_diff>
--- a/34_HOC2.pptx
+++ b/34_HOC2.pptx
@@ -5,7 +5,7 @@
     <p:sldMasterId id="2147483648" r:id="rId1"/>
   </p:sldMasterIdLst>
   <p:notesMasterIdLst>
-    <p:notesMasterId r:id="rId36"/>
+    <p:notesMasterId r:id="rId38"/>
   </p:notesMasterIdLst>
   <p:sldIdLst>
     <p:sldId id="256" r:id="rId2"/>
@@ -41,7 +41,9 @@
     <p:sldId id="281" r:id="rId32"/>
     <p:sldId id="297" r:id="rId33"/>
     <p:sldId id="298" r:id="rId34"/>
-    <p:sldId id="259" r:id="rId35"/>
+    <p:sldId id="299" r:id="rId35"/>
+    <p:sldId id="300" r:id="rId36"/>
+    <p:sldId id="259" r:id="rId37"/>
   </p:sldIdLst>
   <p:sldSz cx="9144000" cy="6858000" type="screen4x3"/>
   <p:notesSz cx="6858000" cy="9144000"/>
@@ -242,7 +244,7 @@
             <a:fld id="{6837EDA8-41C8-4B24-A206-13C08A65A6D7}" type="datetimeFigureOut">
               <a:rPr lang="zh-TW" altLang="en-US" smtClean="0"/>
               <a:pPr/>
-              <a:t>2020/5/24</a:t>
+              <a:t>2020/6/28</a:t>
             </a:fld>
             <a:endParaRPr lang="zh-TW" altLang="en-US"/>
           </a:p>
@@ -695,7 +697,7 @@
             <a:fld id="{8B85509C-BD4F-47BF-9B1E-FC2E949B3621}" type="datetime1">
               <a:rPr lang="zh-TW" altLang="en-US" smtClean="0"/>
               <a:pPr/>
-              <a:t>2020/5/24</a:t>
+              <a:t>2020/6/28</a:t>
             </a:fld>
             <a:endParaRPr lang="zh-TW" altLang="en-US"/>
           </a:p>
@@ -868,7 +870,7 @@
             <a:fld id="{42251B24-F787-4C15-8A0F-7AEC20C70069}" type="datetime1">
               <a:rPr lang="zh-TW" altLang="en-US" smtClean="0"/>
               <a:pPr/>
-              <a:t>2020/5/24</a:t>
+              <a:t>2020/6/28</a:t>
             </a:fld>
             <a:endParaRPr lang="zh-TW" altLang="en-US"/>
           </a:p>
@@ -1043,7 +1045,7 @@
             <a:fld id="{9CA0D33C-CE2B-45F1-B8D4-FFD1F131F331}" type="datetime1">
               <a:rPr lang="zh-TW" altLang="en-US" smtClean="0"/>
               <a:pPr/>
-              <a:t>2020/5/24</a:t>
+              <a:t>2020/6/28</a:t>
             </a:fld>
             <a:endParaRPr lang="zh-TW" altLang="en-US"/>
           </a:p>
@@ -1208,7 +1210,7 @@
             <a:fld id="{50B99440-D9EF-40CC-9B52-F6428D9B2C76}" type="datetime1">
               <a:rPr lang="zh-TW" altLang="en-US" smtClean="0"/>
               <a:pPr/>
-              <a:t>2020/5/24</a:t>
+              <a:t>2020/6/28</a:t>
             </a:fld>
             <a:endParaRPr lang="zh-TW" altLang="en-US"/>
           </a:p>
@@ -1450,7 +1452,7 @@
             <a:fld id="{0871BF52-5C6C-4959-8E27-CECB68D39FE4}" type="datetime1">
               <a:rPr lang="zh-TW" altLang="en-US" smtClean="0"/>
               <a:pPr/>
-              <a:t>2020/5/24</a:t>
+              <a:t>2020/6/28</a:t>
             </a:fld>
             <a:endParaRPr lang="zh-TW" altLang="en-US"/>
           </a:p>
@@ -1732,7 +1734,7 @@
             <a:fld id="{DF863F05-2DD9-4EB1-A827-12FD992DE9DC}" type="datetime1">
               <a:rPr lang="zh-TW" altLang="en-US" smtClean="0"/>
               <a:pPr/>
-              <a:t>2020/5/24</a:t>
+              <a:t>2020/6/28</a:t>
             </a:fld>
             <a:endParaRPr lang="zh-TW" altLang="en-US"/>
           </a:p>
@@ -2148,7 +2150,7 @@
             <a:fld id="{6339AF51-4491-4873-A096-75DB6CE47516}" type="datetime1">
               <a:rPr lang="zh-TW" altLang="en-US" smtClean="0"/>
               <a:pPr/>
-              <a:t>2020/5/24</a:t>
+              <a:t>2020/6/28</a:t>
             </a:fld>
             <a:endParaRPr lang="zh-TW" altLang="en-US"/>
           </a:p>
@@ -2262,7 +2264,7 @@
             <a:fld id="{EE4AD9C8-8B9E-40FF-ABE2-858AC2057BBB}" type="datetime1">
               <a:rPr lang="zh-TW" altLang="en-US" smtClean="0"/>
               <a:pPr/>
-              <a:t>2020/5/24</a:t>
+              <a:t>2020/6/28</a:t>
             </a:fld>
             <a:endParaRPr lang="zh-TW" altLang="en-US"/>
           </a:p>
@@ -2354,7 +2356,7 @@
             <a:fld id="{B4784999-BBBE-4BE4-A8D0-877E7D1D66CC}" type="datetime1">
               <a:rPr lang="zh-TW" altLang="en-US" smtClean="0"/>
               <a:pPr/>
-              <a:t>2020/5/24</a:t>
+              <a:t>2020/6/28</a:t>
             </a:fld>
             <a:endParaRPr lang="zh-TW" altLang="en-US"/>
           </a:p>
@@ -2626,7 +2628,7 @@
             <a:fld id="{E88D17E6-02BD-4944-B9FE-7BFCCBF83D48}" type="datetime1">
               <a:rPr lang="zh-TW" altLang="en-US" smtClean="0"/>
               <a:pPr/>
-              <a:t>2020/5/24</a:t>
+              <a:t>2020/6/28</a:t>
             </a:fld>
             <a:endParaRPr lang="zh-TW" altLang="en-US"/>
           </a:p>
@@ -2875,7 +2877,7 @@
             <a:fld id="{3C13E23D-1FEF-4D78-A3A3-3D6F2BB31954}" type="datetime1">
               <a:rPr lang="zh-TW" altLang="en-US" smtClean="0"/>
               <a:pPr/>
-              <a:t>2020/5/24</a:t>
+              <a:t>2020/6/28</a:t>
             </a:fld>
             <a:endParaRPr lang="zh-TW" altLang="en-US"/>
           </a:p>
@@ -3083,7 +3085,7 @@
             <a:fld id="{06197F35-AD6F-4594-8B50-334492D2E7E8}" type="datetime1">
               <a:rPr lang="zh-TW" altLang="en-US" smtClean="0"/>
               <a:pPr/>
-              <a:t>2020/5/24</a:t>
+              <a:t>2020/6/28</a:t>
             </a:fld>
             <a:endParaRPr lang="zh-TW" altLang="en-US"/>
           </a:p>
@@ -3544,7 +3546,7 @@
             <a:fld id="{C389EDC9-19E3-47AC-9C57-C6A24DEA81AD}" type="datetime1">
               <a:rPr lang="zh-TW" altLang="en-US" smtClean="0"/>
               <a:pPr/>
-              <a:t>2020/5/24</a:t>
+              <a:t>2020/6/28</a:t>
             </a:fld>
             <a:endParaRPr lang="zh-TW" altLang="en-US"/>
           </a:p>
@@ -3878,7 +3880,7 @@
             <a:fld id="{A4F910E6-8D00-4BAF-8C48-9688E0B449D3}" type="datetime1">
               <a:rPr lang="zh-TW" altLang="en-US" smtClean="0"/>
               <a:pPr/>
-              <a:t>2020/5/24</a:t>
+              <a:t>2020/6/28</a:t>
             </a:fld>
             <a:endParaRPr lang="zh-TW" altLang="en-US"/>
           </a:p>
@@ -4152,7 +4154,7 @@
             <a:fld id="{C389EDC9-19E3-47AC-9C57-C6A24DEA81AD}" type="datetime1">
               <a:rPr lang="zh-TW" altLang="en-US" smtClean="0"/>
               <a:pPr/>
-              <a:t>2020/5/24</a:t>
+              <a:t>2020/6/28</a:t>
             </a:fld>
             <a:endParaRPr lang="zh-TW" altLang="en-US"/>
           </a:p>
@@ -4565,7 +4567,7 @@
             <a:fld id="{A4F910E6-8D00-4BAF-8C48-9688E0B449D3}" type="datetime1">
               <a:rPr lang="zh-TW" altLang="en-US" smtClean="0"/>
               <a:pPr/>
-              <a:t>2020/5/24</a:t>
+              <a:t>2020/6/28</a:t>
             </a:fld>
             <a:endParaRPr lang="zh-TW" altLang="en-US"/>
           </a:p>
@@ -5035,7 +5037,7 @@
             <a:fld id="{A4F910E6-8D00-4BAF-8C48-9688E0B449D3}" type="datetime1">
               <a:rPr lang="zh-TW" altLang="en-US" smtClean="0"/>
               <a:pPr/>
-              <a:t>2020/5/24</a:t>
+              <a:t>2020/6/28</a:t>
             </a:fld>
             <a:endParaRPr lang="zh-TW" altLang="en-US"/>
           </a:p>
@@ -5399,7 +5401,7 @@
             <a:fld id="{A4F910E6-8D00-4BAF-8C48-9688E0B449D3}" type="datetime1">
               <a:rPr lang="zh-TW" altLang="en-US" smtClean="0"/>
               <a:pPr/>
-              <a:t>2020/5/24</a:t>
+              <a:t>2020/6/28</a:t>
             </a:fld>
             <a:endParaRPr lang="zh-TW" altLang="en-US"/>
           </a:p>
@@ -5799,7 +5801,7 @@
             <a:fld id="{A4F910E6-8D00-4BAF-8C48-9688E0B449D3}" type="datetime1">
               <a:rPr lang="zh-TW" altLang="en-US" smtClean="0"/>
               <a:pPr/>
-              <a:t>2020/5/24</a:t>
+              <a:t>2020/6/28</a:t>
             </a:fld>
             <a:endParaRPr lang="zh-TW" altLang="en-US"/>
           </a:p>
@@ -6199,7 +6201,7 @@
             <a:fld id="{A4F910E6-8D00-4BAF-8C48-9688E0B449D3}" type="datetime1">
               <a:rPr lang="zh-TW" altLang="en-US" smtClean="0"/>
               <a:pPr/>
-              <a:t>2020/5/24</a:t>
+              <a:t>2020/6/28</a:t>
             </a:fld>
             <a:endParaRPr lang="zh-TW" altLang="en-US"/>
           </a:p>
@@ -6563,7 +6565,7 @@
             <a:fld id="{A4F910E6-8D00-4BAF-8C48-9688E0B449D3}" type="datetime1">
               <a:rPr lang="zh-TW" altLang="en-US" smtClean="0"/>
               <a:pPr/>
-              <a:t>2020/5/24</a:t>
+              <a:t>2020/6/28</a:t>
             </a:fld>
             <a:endParaRPr lang="zh-TW" altLang="en-US"/>
           </a:p>
@@ -6774,7 +6776,7 @@
             <a:fld id="{C389EDC9-19E3-47AC-9C57-C6A24DEA81AD}" type="datetime1">
               <a:rPr lang="zh-TW" altLang="en-US" smtClean="0"/>
               <a:pPr/>
-              <a:t>2020/5/24</a:t>
+              <a:t>2020/6/28</a:t>
             </a:fld>
             <a:endParaRPr lang="zh-TW" altLang="en-US"/>
           </a:p>
@@ -7115,7 +7117,7 @@
             <a:fld id="{A4F910E6-8D00-4BAF-8C48-9688E0B449D3}" type="datetime1">
               <a:rPr lang="zh-TW" altLang="en-US" smtClean="0"/>
               <a:pPr/>
-              <a:t>2020/5/24</a:t>
+              <a:t>2020/6/28</a:t>
             </a:fld>
             <a:endParaRPr lang="zh-TW" altLang="en-US"/>
           </a:p>
@@ -7586,7 +7588,7 @@
             <a:fld id="{A4F910E6-8D00-4BAF-8C48-9688E0B449D3}" type="datetime1">
               <a:rPr lang="zh-TW" altLang="en-US" smtClean="0"/>
               <a:pPr/>
-              <a:t>2020/5/24</a:t>
+              <a:t>2020/6/28</a:t>
             </a:fld>
             <a:endParaRPr lang="zh-TW" altLang="en-US"/>
           </a:p>
@@ -7710,7 +7712,7 @@
             <a:fld id="{C389EDC9-19E3-47AC-9C57-C6A24DEA81AD}" type="datetime1">
               <a:rPr lang="zh-TW" altLang="en-US" smtClean="0"/>
               <a:pPr/>
-              <a:t>2020/5/24</a:t>
+              <a:t>2020/6/28</a:t>
             </a:fld>
             <a:endParaRPr lang="zh-TW" altLang="en-US"/>
           </a:p>
@@ -8200,7 +8202,7 @@
             <a:fld id="{A4F910E6-8D00-4BAF-8C48-9688E0B449D3}" type="datetime1">
               <a:rPr lang="zh-TW" altLang="en-US" smtClean="0"/>
               <a:pPr/>
-              <a:t>2020/5/24</a:t>
+              <a:t>2020/6/28</a:t>
             </a:fld>
             <a:endParaRPr lang="zh-TW" altLang="en-US"/>
           </a:p>
@@ -8588,7 +8590,7 @@
             <a:fld id="{A4F910E6-8D00-4BAF-8C48-9688E0B449D3}" type="datetime1">
               <a:rPr lang="zh-TW" altLang="en-US" smtClean="0"/>
               <a:pPr/>
-              <a:t>2020/5/24</a:t>
+              <a:t>2020/6/28</a:t>
             </a:fld>
             <a:endParaRPr lang="zh-TW" altLang="en-US"/>
           </a:p>
@@ -9009,7 +9011,7 @@
             <a:fld id="{A4F910E6-8D00-4BAF-8C48-9688E0B449D3}" type="datetime1">
               <a:rPr lang="zh-TW" altLang="en-US" smtClean="0"/>
               <a:pPr/>
-              <a:t>2020/5/24</a:t>
+              <a:t>2020/6/28</a:t>
             </a:fld>
             <a:endParaRPr lang="zh-TW" altLang="en-US"/>
           </a:p>
@@ -9477,7 +9479,7 @@
             <a:fld id="{A4F910E6-8D00-4BAF-8C48-9688E0B449D3}" type="datetime1">
               <a:rPr lang="zh-TW" altLang="en-US" smtClean="0"/>
               <a:pPr/>
-              <a:t>2020/5/24</a:t>
+              <a:t>2020/6/28</a:t>
             </a:fld>
             <a:endParaRPr lang="zh-TW" altLang="en-US"/>
           </a:p>
@@ -9688,7 +9690,7 @@
             <a:fld id="{C389EDC9-19E3-47AC-9C57-C6A24DEA81AD}" type="datetime1">
               <a:rPr lang="zh-TW" altLang="en-US" smtClean="0"/>
               <a:pPr/>
-              <a:t>2020/5/24</a:t>
+              <a:t>2020/6/28</a:t>
             </a:fld>
             <a:endParaRPr lang="zh-TW" altLang="en-US"/>
           </a:p>
@@ -10103,7 +10105,7 @@
             <a:fld id="{A4F910E6-8D00-4BAF-8C48-9688E0B449D3}" type="datetime1">
               <a:rPr lang="zh-TW" altLang="en-US" smtClean="0"/>
               <a:pPr/>
-              <a:t>2020/5/24</a:t>
+              <a:t>2020/6/28</a:t>
             </a:fld>
             <a:endParaRPr lang="zh-TW" altLang="en-US"/>
           </a:p>
@@ -10262,7 +10264,7 @@
             <a:fld id="{C389EDC9-19E3-47AC-9C57-C6A24DEA81AD}" type="datetime1">
               <a:rPr lang="zh-TW" altLang="en-US" smtClean="0"/>
               <a:pPr/>
-              <a:t>2020/5/24</a:t>
+              <a:t>2020/6/28</a:t>
             </a:fld>
             <a:endParaRPr lang="zh-TW" altLang="en-US"/>
           </a:p>
@@ -10622,7 +10624,7 @@
             <a:fld id="{A4F910E6-8D00-4BAF-8C48-9688E0B449D3}" type="datetime1">
               <a:rPr lang="zh-TW" altLang="en-US" smtClean="0"/>
               <a:pPr/>
-              <a:t>2020/5/24</a:t>
+              <a:t>2020/6/28</a:t>
             </a:fld>
             <a:endParaRPr lang="zh-TW" altLang="en-US"/>
           </a:p>
@@ -10935,7 +10937,7 @@
             <a:fld id="{A4F910E6-8D00-4BAF-8C48-9688E0B449D3}" type="datetime1">
               <a:rPr lang="zh-TW" altLang="en-US" smtClean="0"/>
               <a:pPr/>
-              <a:t>2020/5/24</a:t>
+              <a:t>2020/6/28</a:t>
             </a:fld>
             <a:endParaRPr lang="zh-TW" altLang="en-US"/>
           </a:p>
@@ -11284,7 +11286,7 @@
             <a:fld id="{A4F910E6-8D00-4BAF-8C48-9688E0B449D3}" type="datetime1">
               <a:rPr lang="zh-TW" altLang="en-US" smtClean="0"/>
               <a:pPr/>
-              <a:t>2020/5/24</a:t>
+              <a:t>2020/6/28</a:t>
             </a:fld>
             <a:endParaRPr lang="zh-TW" altLang="en-US"/>
           </a:p>
@@ -11721,7 +11723,7 @@
             <a:fld id="{A4F910E6-8D00-4BAF-8C48-9688E0B449D3}" type="datetime1">
               <a:rPr lang="zh-TW" altLang="en-US" smtClean="0"/>
               <a:pPr/>
-              <a:t>2020/5/24</a:t>
+              <a:t>2020/6/28</a:t>
             </a:fld>
             <a:endParaRPr lang="zh-TW" altLang="en-US"/>
           </a:p>
@@ -12210,7 +12212,7 @@
             <a:fld id="{A4F910E6-8D00-4BAF-8C48-9688E0B449D3}" type="datetime1">
               <a:rPr lang="zh-TW" altLang="en-US" smtClean="0"/>
               <a:pPr/>
-              <a:t>2020/5/24</a:t>
+              <a:t>2020/6/28</a:t>
             </a:fld>
             <a:endParaRPr lang="zh-TW" altLang="en-US"/>
           </a:p>
@@ -12580,7 +12582,7 @@
             <a:fld id="{A4F910E6-8D00-4BAF-8C48-9688E0B449D3}" type="datetime1">
               <a:rPr lang="zh-TW" altLang="en-US" smtClean="0"/>
               <a:pPr/>
-              <a:t>2020/5/24</a:t>
+              <a:t>2020/6/28</a:t>
             </a:fld>
             <a:endParaRPr lang="zh-TW" altLang="en-US"/>
           </a:p>
@@ -13705,7 +13707,7 @@
             <a:fld id="{A4F910E6-8D00-4BAF-8C48-9688E0B449D3}" type="datetime1">
               <a:rPr lang="zh-TW" altLang="en-US" smtClean="0"/>
               <a:pPr/>
-              <a:t>2020/5/24</a:t>
+              <a:t>2020/6/28</a:t>
             </a:fld>
             <a:endParaRPr lang="zh-TW" altLang="en-US"/>
           </a:p>
@@ -14356,32 +14358,9 @@
             <a:off x="0" y="2130425"/>
             <a:ext cx="9144000" cy="1470025"/>
           </a:xfrm>
-          <a:gradFill flip="none" rotWithShape="1">
-            <a:gsLst>
-              <a:gs pos="0">
-                <a:srgbClr val="00B0F0">
-                  <a:shade val="30000"/>
-                  <a:satMod val="115000"/>
-                </a:srgbClr>
-              </a:gs>
-              <a:gs pos="50000">
-                <a:srgbClr val="00B0F0">
-                  <a:shade val="67500"/>
-                  <a:satMod val="115000"/>
-                </a:srgbClr>
-              </a:gs>
-              <a:gs pos="100000">
-                <a:srgbClr val="00B0F0">
-                  <a:shade val="100000"/>
-                  <a:satMod val="115000"/>
-                </a:srgbClr>
-              </a:gs>
-            </a:gsLst>
-            <a:path path="circle">
-              <a:fillToRect t="100000" r="100000"/>
-            </a:path>
-            <a:tileRect l="-100000" b="-100000"/>
-          </a:gradFill>
+          <a:solidFill>
+            <a:srgbClr val="00B0F0"/>
+          </a:solidFill>
         </p:spPr>
         <p:txBody>
           <a:bodyPr>
@@ -14390,14 +14369,14 @@
           <a:lstStyle/>
           <a:p>
             <a:r>
-              <a:rPr lang="en-US" altLang="zh-TW" sz="6000" b="1" dirty="0">
+              <a:rPr lang="en-US" altLang="zh-TW" sz="4800" b="1" dirty="0">
                 <a:solidFill>
                   <a:srgbClr val="FFFF00"/>
                 </a:solidFill>
               </a:rPr>
-              <a:t>End of Chapter</a:t>
-            </a:r>
-            <a:endParaRPr lang="zh-TW" altLang="en-US" sz="6000" b="1" dirty="0">
+              <a:t>34.6 Quiz</a:t>
+            </a:r>
+            <a:endParaRPr lang="zh-TW" altLang="en-US" sz="4800" b="1" dirty="0">
               <a:solidFill>
                 <a:srgbClr val="FFFF00"/>
               </a:solidFill>
@@ -14420,10 +14399,10 @@
           <a:bodyPr/>
           <a:lstStyle/>
           <a:p>
-            <a:fld id="{4E46BE27-E923-4EC2-B046-3272AE2A3E5C}" type="datetime1">
+            <a:fld id="{C389EDC9-19E3-47AC-9C57-C6A24DEA81AD}" type="datetime1">
               <a:rPr lang="zh-TW" altLang="en-US" smtClean="0"/>
               <a:pPr/>
-              <a:t>2020/5/24</a:t>
+              <a:t>2020/6/28</a:t>
             </a:fld>
             <a:endParaRPr lang="zh-TW" altLang="en-US"/>
           </a:p>
@@ -14453,7 +14432,44 @@
           </a:p>
         </p:txBody>
       </p:sp>
+      <p:pic>
+        <p:nvPicPr>
+          <p:cNvPr id="2050" name="Picture 2"/>
+          <p:cNvPicPr>
+            <a:picLocks noChangeAspect="1" noChangeArrowheads="1"/>
+          </p:cNvPicPr>
+          <p:nvPr/>
+        </p:nvPicPr>
+        <p:blipFill>
+          <a:blip r:embed="rId2" cstate="print"/>
+          <a:srcRect/>
+          <a:stretch>
+            <a:fillRect/>
+          </a:stretch>
+        </p:blipFill>
+        <p:spPr bwMode="auto">
+          <a:xfrm>
+            <a:off x="4283968" y="3717032"/>
+            <a:ext cx="713805" cy="644588"/>
+          </a:xfrm>
+          <a:prstGeom prst="rect">
+            <a:avLst/>
+          </a:prstGeom>
+          <a:noFill/>
+          <a:ln w="9525">
+            <a:noFill/>
+            <a:miter lim="800000"/>
+            <a:headEnd/>
+            <a:tailEnd/>
+          </a:ln>
+        </p:spPr>
+      </p:pic>
     </p:spTree>
+    <p:extLst>
+      <p:ext uri="{BB962C8B-B14F-4D97-AF65-F5344CB8AC3E}">
+        <p14:creationId xmlns:p14="http://schemas.microsoft.com/office/powerpoint/2010/main" val="3856122532"/>
+      </p:ext>
+    </p:extLst>
   </p:cSld>
   <p:clrMapOvr>
     <a:masterClrMapping/>
@@ -14461,7 +14477,7 @@
 </p:sld>
 </file>
 
-<file path=ppt/slides/slide4.xml><?xml version="1.0" encoding="utf-8"?>
+<file path=ppt/slides/slide35.xml><?xml version="1.0" encoding="utf-8"?>
 <p:sld xmlns:a="http://schemas.openxmlformats.org/drawingml/2006/main" xmlns:r="http://schemas.openxmlformats.org/officeDocument/2006/relationships" xmlns:p="http://schemas.openxmlformats.org/presentationml/2006/main">
   <p:cSld>
     <p:spTree>
@@ -14533,7 +14549,7 @@
                   <a:srgbClr val="FFFF00"/>
                 </a:solidFill>
               </a:rPr>
-              <a:t>34 Higher Order Components 2</a:t>
+              <a:t>34.6 Quiz</a:t>
             </a:r>
             <a:endParaRPr lang="zh-TW" altLang="en-US" b="1" dirty="0">
               <a:solidFill>
@@ -14555,8 +14571,8 @@
         </p:nvSpPr>
         <p:spPr>
           <a:xfrm>
-            <a:off x="467544" y="1340768"/>
-            <a:ext cx="8352928" cy="826066"/>
+            <a:off x="467542" y="1340766"/>
+            <a:ext cx="8155722" cy="2323607"/>
           </a:xfrm>
           <a:ln>
             <a:solidFill>
@@ -14581,11 +14597,11 @@
             <a:r>
               <a:rPr lang="en-US" altLang="zh-TW" sz="1800" b="1" dirty="0">
                 <a:solidFill>
-                  <a:srgbClr val="C00000"/>
+                  <a:schemeClr val="tx1"/>
                 </a:solidFill>
                 <a:latin typeface="+mj-lt"/>
               </a:rPr>
-              <a:t>HOC (Higher Order Component)</a:t>
+              <a:t>Quiz</a:t>
             </a:r>
           </a:p>
           <a:p>
@@ -14598,12 +14614,70 @@
               <a:buChar char="u"/>
             </a:pPr>
             <a:r>
-              <a:rPr lang="en-US" altLang="zh-TW" sz="1800" b="1" dirty="0">
+              <a:rPr lang="en-US" altLang="zh-TW" sz="1800" dirty="0">
                 <a:solidFill>
                   <a:schemeClr val="tx1"/>
                 </a:solidFill>
-              </a:rPr>
-              <a:t>In simple code, it will look something like this:</a:t>
+                <a:latin typeface="+mj-lt"/>
+              </a:rPr>
+              <a:t>1. What are two steps of HOC?</a:t>
+            </a:r>
+          </a:p>
+          <a:p>
+            <a:pPr marL="342900" indent="-342900" algn="l">
+              <a:buClr>
+                <a:srgbClr val="0070C0"/>
+              </a:buClr>
+              <a:buSzPct val="80000"/>
+              <a:buFont typeface="Wingdings" pitchFamily="2" charset="2"/>
+              <a:buChar char="u"/>
+            </a:pPr>
+            <a:r>
+              <a:rPr lang="en-US" altLang="zh-TW" sz="1800" dirty="0">
+                <a:solidFill>
+                  <a:schemeClr val="tx1"/>
+                </a:solidFill>
+                <a:latin typeface="+mj-lt"/>
+              </a:rPr>
+              <a:t>Ans: We can reuse clickCounter.js code immediate thought is to lift this state to the parent component (App.js) and pass down the handler as a props.</a:t>
+            </a:r>
+          </a:p>
+          <a:p>
+            <a:pPr marL="342900" indent="-342900" algn="l">
+              <a:buClr>
+                <a:srgbClr val="0070C0"/>
+              </a:buClr>
+              <a:buSzPct val="80000"/>
+              <a:buFont typeface="+mj-lt"/>
+              <a:buAutoNum type="arabicPeriod"/>
+            </a:pPr>
+            <a:r>
+              <a:rPr lang="en-US" altLang="zh-TW" sz="1800" dirty="0">
+                <a:solidFill>
+                  <a:schemeClr val="tx1"/>
+                </a:solidFill>
+                <a:latin typeface="+mj-lt"/>
+              </a:rPr>
+              <a:t>Define the counter functionality in App Component and provide the state and the handler </a:t>
+            </a:r>
+          </a:p>
+          <a:p>
+            <a:pPr marL="342900" indent="-342900" algn="l">
+              <a:buClr>
+                <a:srgbClr val="0070C0"/>
+              </a:buClr>
+              <a:buSzPct val="80000"/>
+              <a:buFont typeface="+mj-lt"/>
+              <a:buAutoNum type="arabicPeriod"/>
+            </a:pPr>
+            <a:r>
+              <a:rPr lang="en-US" altLang="zh-TW" sz="1800" dirty="0">
+                <a:solidFill>
+                  <a:schemeClr val="tx1"/>
+                </a:solidFill>
+                <a:latin typeface="+mj-lt"/>
+              </a:rPr>
+              <a:t>Passed props to click counter and hover counter.</a:t>
             </a:r>
           </a:p>
         </p:txBody>
@@ -14690,7 +14764,1211 @@
             <a:fld id="{A4F910E6-8D00-4BAF-8C48-9688E0B449D3}" type="datetime1">
               <a:rPr lang="zh-TW" altLang="en-US" smtClean="0"/>
               <a:pPr/>
-              <a:t>2020/5/24</a:t>
+              <a:t>2020/6/28</a:t>
+            </a:fld>
+            <a:endParaRPr lang="zh-TW" altLang="en-US"/>
+          </a:p>
+        </p:txBody>
+      </p:sp>
+      <p:sp>
+        <p:nvSpPr>
+          <p:cNvPr id="6" name="投影片編號版面配置區 5"/>
+          <p:cNvSpPr>
+            <a:spLocks noGrp="1"/>
+          </p:cNvSpPr>
+          <p:nvPr>
+            <p:ph type="sldNum" sz="quarter" idx="12"/>
+          </p:nvPr>
+        </p:nvSpPr>
+        <p:spPr>
+          <a:xfrm>
+            <a:off x="6553200" y="6356350"/>
+            <a:ext cx="2133600" cy="404246"/>
+          </a:xfrm>
+        </p:spPr>
+        <p:txBody>
+          <a:bodyPr/>
+          <a:lstStyle/>
+          <a:p>
+            <a:fld id="{E4D7E63D-91F2-4366-A2C4-1B00C9E2590E}" type="slidenum">
+              <a:rPr lang="zh-TW" altLang="en-US" smtClean="0"/>
+              <a:pPr/>
+              <a:t>35</a:t>
+            </a:fld>
+            <a:endParaRPr lang="zh-TW" altLang="en-US"/>
+          </a:p>
+        </p:txBody>
+      </p:sp>
+      <p:sp>
+        <p:nvSpPr>
+          <p:cNvPr id="8" name="Rectangle 7">
+            <a:extLst>
+              <a:ext uri="{FF2B5EF4-FFF2-40B4-BE49-F238E27FC236}">
+                <a16:creationId xmlns:a16="http://schemas.microsoft.com/office/drawing/2014/main" id="{2D9CFC98-697F-451F-879C-DF17812B785F}"/>
+              </a:ext>
+            </a:extLst>
+          </p:cNvPr>
+          <p:cNvSpPr/>
+          <p:nvPr/>
+        </p:nvSpPr>
+        <p:spPr>
+          <a:xfrm>
+            <a:off x="2905258" y="4208312"/>
+            <a:ext cx="1296144" cy="288032"/>
+          </a:xfrm>
+          <a:prstGeom prst="rect">
+            <a:avLst/>
+          </a:prstGeom>
+        </p:spPr>
+        <p:style>
+          <a:lnRef idx="2">
+            <a:schemeClr val="accent1">
+              <a:shade val="50000"/>
+            </a:schemeClr>
+          </a:lnRef>
+          <a:fillRef idx="1">
+            <a:schemeClr val="accent1"/>
+          </a:fillRef>
+          <a:effectRef idx="0">
+            <a:schemeClr val="accent1"/>
+          </a:effectRef>
+          <a:fontRef idx="minor">
+            <a:schemeClr val="lt1"/>
+          </a:fontRef>
+        </p:style>
+        <p:txBody>
+          <a:bodyPr rtlCol="0" anchor="ctr"/>
+          <a:lstStyle/>
+          <a:p>
+            <a:pPr algn="ctr"/>
+            <a:r>
+              <a:rPr lang="en-US" dirty="0"/>
+              <a:t>Parent</a:t>
+            </a:r>
+          </a:p>
+        </p:txBody>
+      </p:sp>
+      <p:sp>
+        <p:nvSpPr>
+          <p:cNvPr id="9" name="Rectangle 8">
+            <a:extLst>
+              <a:ext uri="{FF2B5EF4-FFF2-40B4-BE49-F238E27FC236}">
+                <a16:creationId xmlns:a16="http://schemas.microsoft.com/office/drawing/2014/main" id="{66888600-E6A3-40D7-ADFB-80CABABB40E5}"/>
+              </a:ext>
+            </a:extLst>
+          </p:cNvPr>
+          <p:cNvSpPr/>
+          <p:nvPr/>
+        </p:nvSpPr>
+        <p:spPr>
+          <a:xfrm>
+            <a:off x="1003085" y="5695411"/>
+            <a:ext cx="1638969" cy="288032"/>
+          </a:xfrm>
+          <a:prstGeom prst="rect">
+            <a:avLst/>
+          </a:prstGeom>
+          <a:solidFill>
+            <a:srgbClr val="00B050"/>
+          </a:solidFill>
+          <a:ln>
+            <a:solidFill>
+              <a:schemeClr val="accent3">
+                <a:lumMod val="75000"/>
+              </a:schemeClr>
+            </a:solidFill>
+          </a:ln>
+        </p:spPr>
+        <p:style>
+          <a:lnRef idx="2">
+            <a:schemeClr val="accent1">
+              <a:shade val="50000"/>
+            </a:schemeClr>
+          </a:lnRef>
+          <a:fillRef idx="1">
+            <a:schemeClr val="accent1"/>
+          </a:fillRef>
+          <a:effectRef idx="0">
+            <a:schemeClr val="accent1"/>
+          </a:effectRef>
+          <a:fontRef idx="minor">
+            <a:schemeClr val="lt1"/>
+          </a:fontRef>
+        </p:style>
+        <p:txBody>
+          <a:bodyPr rtlCol="0" anchor="ctr"/>
+          <a:lstStyle/>
+          <a:p>
+            <a:pPr algn="ctr"/>
+            <a:r>
+              <a:rPr lang="en-US" dirty="0" err="1"/>
+              <a:t>ClickCounter</a:t>
+            </a:r>
+            <a:endParaRPr lang="en-US" dirty="0"/>
+          </a:p>
+        </p:txBody>
+      </p:sp>
+      <p:sp>
+        <p:nvSpPr>
+          <p:cNvPr id="10" name="Rectangle 9">
+            <a:extLst>
+              <a:ext uri="{FF2B5EF4-FFF2-40B4-BE49-F238E27FC236}">
+                <a16:creationId xmlns:a16="http://schemas.microsoft.com/office/drawing/2014/main" id="{8C9D6E83-E981-4099-924D-F18444121110}"/>
+              </a:ext>
+            </a:extLst>
+          </p:cNvPr>
+          <p:cNvSpPr/>
+          <p:nvPr/>
+        </p:nvSpPr>
+        <p:spPr>
+          <a:xfrm>
+            <a:off x="4372816" y="5695411"/>
+            <a:ext cx="1638969" cy="288032"/>
+          </a:xfrm>
+          <a:prstGeom prst="rect">
+            <a:avLst/>
+          </a:prstGeom>
+          <a:solidFill>
+            <a:srgbClr val="00B050"/>
+          </a:solidFill>
+          <a:ln>
+            <a:solidFill>
+              <a:schemeClr val="accent3">
+                <a:lumMod val="75000"/>
+              </a:schemeClr>
+            </a:solidFill>
+          </a:ln>
+        </p:spPr>
+        <p:style>
+          <a:lnRef idx="2">
+            <a:schemeClr val="accent1">
+              <a:shade val="50000"/>
+            </a:schemeClr>
+          </a:lnRef>
+          <a:fillRef idx="1">
+            <a:schemeClr val="accent1"/>
+          </a:fillRef>
+          <a:effectRef idx="0">
+            <a:schemeClr val="accent1"/>
+          </a:effectRef>
+          <a:fontRef idx="minor">
+            <a:schemeClr val="lt1"/>
+          </a:fontRef>
+        </p:style>
+        <p:txBody>
+          <a:bodyPr rtlCol="0" anchor="ctr"/>
+          <a:lstStyle/>
+          <a:p>
+            <a:pPr algn="ctr"/>
+            <a:r>
+              <a:rPr lang="en-US" dirty="0" err="1"/>
+              <a:t>HoverCounter</a:t>
+            </a:r>
+            <a:endParaRPr lang="en-US" dirty="0"/>
+          </a:p>
+        </p:txBody>
+      </p:sp>
+      <p:cxnSp>
+        <p:nvCxnSpPr>
+          <p:cNvPr id="11" name="Connector: Elbow 10">
+            <a:extLst>
+              <a:ext uri="{FF2B5EF4-FFF2-40B4-BE49-F238E27FC236}">
+                <a16:creationId xmlns:a16="http://schemas.microsoft.com/office/drawing/2014/main" id="{54F6FFB6-FAA1-462A-9BE7-170B16F8D19D}"/>
+              </a:ext>
+            </a:extLst>
+          </p:cNvPr>
+          <p:cNvCxnSpPr>
+            <a:stCxn id="8" idx="2"/>
+            <a:endCxn id="9" idx="0"/>
+          </p:cNvCxnSpPr>
+          <p:nvPr/>
+        </p:nvCxnSpPr>
+        <p:spPr>
+          <a:xfrm rot="5400000">
+            <a:off x="2088417" y="4230497"/>
+            <a:ext cx="1199067" cy="1730760"/>
+          </a:xfrm>
+          <a:prstGeom prst="bentConnector3">
+            <a:avLst/>
+          </a:prstGeom>
+          <a:ln>
+            <a:tailEnd type="triangle"/>
+          </a:ln>
+        </p:spPr>
+        <p:style>
+          <a:lnRef idx="1">
+            <a:schemeClr val="accent1"/>
+          </a:lnRef>
+          <a:fillRef idx="0">
+            <a:schemeClr val="accent1"/>
+          </a:fillRef>
+          <a:effectRef idx="0">
+            <a:schemeClr val="accent1"/>
+          </a:effectRef>
+          <a:fontRef idx="minor">
+            <a:schemeClr val="tx1"/>
+          </a:fontRef>
+        </p:style>
+      </p:cxnSp>
+      <p:cxnSp>
+        <p:nvCxnSpPr>
+          <p:cNvPr id="12" name="Connector: Elbow 11">
+            <a:extLst>
+              <a:ext uri="{FF2B5EF4-FFF2-40B4-BE49-F238E27FC236}">
+                <a16:creationId xmlns:a16="http://schemas.microsoft.com/office/drawing/2014/main" id="{16820EA2-D059-4F35-9D96-7E9F2F6865D7}"/>
+              </a:ext>
+            </a:extLst>
+          </p:cNvPr>
+          <p:cNvCxnSpPr>
+            <a:stCxn id="8" idx="2"/>
+            <a:endCxn id="10" idx="0"/>
+          </p:cNvCxnSpPr>
+          <p:nvPr/>
+        </p:nvCxnSpPr>
+        <p:spPr>
+          <a:xfrm rot="16200000" flipH="1">
+            <a:off x="3773282" y="4276391"/>
+            <a:ext cx="1199067" cy="1638971"/>
+          </a:xfrm>
+          <a:prstGeom prst="bentConnector3">
+            <a:avLst/>
+          </a:prstGeom>
+          <a:ln>
+            <a:tailEnd type="triangle"/>
+          </a:ln>
+        </p:spPr>
+        <p:style>
+          <a:lnRef idx="1">
+            <a:schemeClr val="accent1"/>
+          </a:lnRef>
+          <a:fillRef idx="0">
+            <a:schemeClr val="accent1"/>
+          </a:fillRef>
+          <a:effectRef idx="0">
+            <a:schemeClr val="accent1"/>
+          </a:effectRef>
+          <a:fontRef idx="minor">
+            <a:schemeClr val="tx1"/>
+          </a:fontRef>
+        </p:style>
+      </p:cxnSp>
+      <p:sp>
+        <p:nvSpPr>
+          <p:cNvPr id="13" name="Rectangle 12">
+            <a:extLst>
+              <a:ext uri="{FF2B5EF4-FFF2-40B4-BE49-F238E27FC236}">
+                <a16:creationId xmlns:a16="http://schemas.microsoft.com/office/drawing/2014/main" id="{B534A6BE-B0D8-4E15-A765-9D060C6EBAE1}"/>
+              </a:ext>
+            </a:extLst>
+          </p:cNvPr>
+          <p:cNvSpPr/>
+          <p:nvPr/>
+        </p:nvSpPr>
+        <p:spPr>
+          <a:xfrm>
+            <a:off x="875346" y="5236349"/>
+            <a:ext cx="874047" cy="288032"/>
+          </a:xfrm>
+          <a:prstGeom prst="rect">
+            <a:avLst/>
+          </a:prstGeom>
+          <a:noFill/>
+          <a:ln>
+            <a:noFill/>
+          </a:ln>
+        </p:spPr>
+        <p:style>
+          <a:lnRef idx="2">
+            <a:schemeClr val="accent1">
+              <a:shade val="50000"/>
+            </a:schemeClr>
+          </a:lnRef>
+          <a:fillRef idx="1">
+            <a:schemeClr val="accent1"/>
+          </a:fillRef>
+          <a:effectRef idx="0">
+            <a:schemeClr val="accent1"/>
+          </a:effectRef>
+          <a:fontRef idx="minor">
+            <a:schemeClr val="lt1"/>
+          </a:fontRef>
+        </p:style>
+        <p:txBody>
+          <a:bodyPr rtlCol="0" anchor="ctr"/>
+          <a:lstStyle/>
+          <a:p>
+            <a:pPr algn="ctr"/>
+            <a:r>
+              <a:rPr lang="en-US" dirty="0">
+                <a:solidFill>
+                  <a:schemeClr val="tx1"/>
+                </a:solidFill>
+              </a:rPr>
+              <a:t>props</a:t>
+            </a:r>
+          </a:p>
+        </p:txBody>
+      </p:sp>
+      <p:sp>
+        <p:nvSpPr>
+          <p:cNvPr id="14" name="Rectangle 13">
+            <a:extLst>
+              <a:ext uri="{FF2B5EF4-FFF2-40B4-BE49-F238E27FC236}">
+                <a16:creationId xmlns:a16="http://schemas.microsoft.com/office/drawing/2014/main" id="{27E2FDD3-472F-461A-B6F8-43DD093D2D09}"/>
+              </a:ext>
+            </a:extLst>
+          </p:cNvPr>
+          <p:cNvSpPr/>
+          <p:nvPr/>
+        </p:nvSpPr>
+        <p:spPr>
+          <a:xfrm>
+            <a:off x="5591575" y="5275253"/>
+            <a:ext cx="840419" cy="183796"/>
+          </a:xfrm>
+          <a:prstGeom prst="rect">
+            <a:avLst/>
+          </a:prstGeom>
+          <a:noFill/>
+          <a:ln>
+            <a:noFill/>
+          </a:ln>
+        </p:spPr>
+        <p:style>
+          <a:lnRef idx="2">
+            <a:schemeClr val="accent1">
+              <a:shade val="50000"/>
+            </a:schemeClr>
+          </a:lnRef>
+          <a:fillRef idx="1">
+            <a:schemeClr val="accent1"/>
+          </a:fillRef>
+          <a:effectRef idx="0">
+            <a:schemeClr val="accent1"/>
+          </a:effectRef>
+          <a:fontRef idx="minor">
+            <a:schemeClr val="lt1"/>
+          </a:fontRef>
+        </p:style>
+        <p:txBody>
+          <a:bodyPr rtlCol="0" anchor="ctr"/>
+          <a:lstStyle/>
+          <a:p>
+            <a:pPr algn="ctr"/>
+            <a:r>
+              <a:rPr lang="en-US" dirty="0">
+                <a:solidFill>
+                  <a:schemeClr val="tx1"/>
+                </a:solidFill>
+              </a:rPr>
+              <a:t>props</a:t>
+            </a:r>
+          </a:p>
+        </p:txBody>
+      </p:sp>
+      <p:cxnSp>
+        <p:nvCxnSpPr>
+          <p:cNvPr id="15" name="Connector: Elbow 14">
+            <a:extLst>
+              <a:ext uri="{FF2B5EF4-FFF2-40B4-BE49-F238E27FC236}">
+                <a16:creationId xmlns:a16="http://schemas.microsoft.com/office/drawing/2014/main" id="{8F671628-E90A-4B56-82B7-D263E087C57D}"/>
+              </a:ext>
+            </a:extLst>
+          </p:cNvPr>
+          <p:cNvCxnSpPr>
+            <a:stCxn id="10" idx="1"/>
+            <a:endCxn id="8" idx="2"/>
+          </p:cNvCxnSpPr>
+          <p:nvPr/>
+        </p:nvCxnSpPr>
+        <p:spPr>
+          <a:xfrm rot="10800000">
+            <a:off x="3553330" y="4496345"/>
+            <a:ext cx="819486" cy="1343083"/>
+          </a:xfrm>
+          <a:prstGeom prst="bentConnector2">
+            <a:avLst/>
+          </a:prstGeom>
+          <a:ln>
+            <a:solidFill>
+              <a:srgbClr val="C00000"/>
+            </a:solidFill>
+            <a:tailEnd type="triangle"/>
+          </a:ln>
+        </p:spPr>
+        <p:style>
+          <a:lnRef idx="1">
+            <a:schemeClr val="accent1"/>
+          </a:lnRef>
+          <a:fillRef idx="0">
+            <a:schemeClr val="accent1"/>
+          </a:fillRef>
+          <a:effectRef idx="0">
+            <a:schemeClr val="accent1"/>
+          </a:effectRef>
+          <a:fontRef idx="minor">
+            <a:schemeClr val="tx1"/>
+          </a:fontRef>
+        </p:style>
+      </p:cxnSp>
+      <p:cxnSp>
+        <p:nvCxnSpPr>
+          <p:cNvPr id="16" name="Connector: Elbow 15">
+            <a:extLst>
+              <a:ext uri="{FF2B5EF4-FFF2-40B4-BE49-F238E27FC236}">
+                <a16:creationId xmlns:a16="http://schemas.microsoft.com/office/drawing/2014/main" id="{0D21E794-D7BE-4BC4-9039-57E44DCA59D6}"/>
+              </a:ext>
+            </a:extLst>
+          </p:cNvPr>
+          <p:cNvCxnSpPr>
+            <a:stCxn id="9" idx="3"/>
+            <a:endCxn id="8" idx="2"/>
+          </p:cNvCxnSpPr>
+          <p:nvPr/>
+        </p:nvCxnSpPr>
+        <p:spPr>
+          <a:xfrm flipV="1">
+            <a:off x="2642054" y="4496344"/>
+            <a:ext cx="911276" cy="1343083"/>
+          </a:xfrm>
+          <a:prstGeom prst="bentConnector2">
+            <a:avLst/>
+          </a:prstGeom>
+          <a:ln>
+            <a:solidFill>
+              <a:srgbClr val="C00000"/>
+            </a:solidFill>
+            <a:tailEnd type="triangle"/>
+          </a:ln>
+        </p:spPr>
+        <p:style>
+          <a:lnRef idx="1">
+            <a:schemeClr val="accent1"/>
+          </a:lnRef>
+          <a:fillRef idx="0">
+            <a:schemeClr val="accent1"/>
+          </a:fillRef>
+          <a:effectRef idx="0">
+            <a:schemeClr val="accent1"/>
+          </a:effectRef>
+          <a:fontRef idx="minor">
+            <a:schemeClr val="tx1"/>
+          </a:fontRef>
+        </p:style>
+      </p:cxnSp>
+      <p:sp>
+        <p:nvSpPr>
+          <p:cNvPr id="17" name="Rectangle 16">
+            <a:extLst>
+              <a:ext uri="{FF2B5EF4-FFF2-40B4-BE49-F238E27FC236}">
+                <a16:creationId xmlns:a16="http://schemas.microsoft.com/office/drawing/2014/main" id="{22D281B3-6087-474D-8BE0-7540858A0782}"/>
+              </a:ext>
+            </a:extLst>
+          </p:cNvPr>
+          <p:cNvSpPr/>
+          <p:nvPr/>
+        </p:nvSpPr>
+        <p:spPr>
+          <a:xfrm>
+            <a:off x="3089242" y="5839427"/>
+            <a:ext cx="874047" cy="288032"/>
+          </a:xfrm>
+          <a:prstGeom prst="rect">
+            <a:avLst/>
+          </a:prstGeom>
+          <a:noFill/>
+          <a:ln>
+            <a:noFill/>
+          </a:ln>
+        </p:spPr>
+        <p:style>
+          <a:lnRef idx="2">
+            <a:schemeClr val="accent1">
+              <a:shade val="50000"/>
+            </a:schemeClr>
+          </a:lnRef>
+          <a:fillRef idx="1">
+            <a:schemeClr val="accent1"/>
+          </a:fillRef>
+          <a:effectRef idx="0">
+            <a:schemeClr val="accent1"/>
+          </a:effectRef>
+          <a:fontRef idx="minor">
+            <a:schemeClr val="lt1"/>
+          </a:fontRef>
+        </p:style>
+        <p:txBody>
+          <a:bodyPr rtlCol="0" anchor="ctr"/>
+          <a:lstStyle/>
+          <a:p>
+            <a:pPr algn="ctr"/>
+            <a:r>
+              <a:rPr lang="en-US" dirty="0">
+                <a:solidFill>
+                  <a:schemeClr val="tx1"/>
+                </a:solidFill>
+              </a:rPr>
+              <a:t>state</a:t>
+            </a:r>
+          </a:p>
+        </p:txBody>
+      </p:sp>
+      <p:sp>
+        <p:nvSpPr>
+          <p:cNvPr id="18" name="Rectangle 17">
+            <a:extLst>
+              <a:ext uri="{FF2B5EF4-FFF2-40B4-BE49-F238E27FC236}">
+                <a16:creationId xmlns:a16="http://schemas.microsoft.com/office/drawing/2014/main" id="{AE43AD6A-37B6-46C2-AE11-D98093B8DC85}"/>
+              </a:ext>
+            </a:extLst>
+          </p:cNvPr>
+          <p:cNvSpPr/>
+          <p:nvPr/>
+        </p:nvSpPr>
+        <p:spPr>
+          <a:xfrm>
+            <a:off x="4470448" y="4166605"/>
+            <a:ext cx="4200578" cy="643672"/>
+          </a:xfrm>
+          <a:prstGeom prst="rect">
+            <a:avLst/>
+          </a:prstGeom>
+          <a:noFill/>
+          <a:ln>
+            <a:noFill/>
+          </a:ln>
+        </p:spPr>
+        <p:style>
+          <a:lnRef idx="2">
+            <a:schemeClr val="accent1">
+              <a:shade val="50000"/>
+            </a:schemeClr>
+          </a:lnRef>
+          <a:fillRef idx="1">
+            <a:schemeClr val="accent1"/>
+          </a:fillRef>
+          <a:effectRef idx="0">
+            <a:schemeClr val="accent1"/>
+          </a:effectRef>
+          <a:fontRef idx="minor">
+            <a:schemeClr val="lt1"/>
+          </a:fontRef>
+        </p:style>
+        <p:txBody>
+          <a:bodyPr rtlCol="0" anchor="ctr"/>
+          <a:lstStyle/>
+          <a:p>
+            <a:pPr marL="342900" indent="-342900">
+              <a:buAutoNum type="arabicPeriod"/>
+            </a:pPr>
+            <a:r>
+              <a:rPr lang="en-US" dirty="0">
+                <a:solidFill>
+                  <a:schemeClr val="tx1"/>
+                </a:solidFill>
+              </a:rPr>
+              <a:t>Lift counter logic (state) to Parent and </a:t>
+            </a:r>
+          </a:p>
+          <a:p>
+            <a:pPr marL="342900" indent="-342900">
+              <a:buAutoNum type="arabicPeriod"/>
+            </a:pPr>
+            <a:r>
+              <a:rPr lang="en-US" dirty="0">
+                <a:solidFill>
+                  <a:schemeClr val="tx1"/>
+                </a:solidFill>
+              </a:rPr>
+              <a:t>pass down the handler as props</a:t>
+            </a:r>
+          </a:p>
+        </p:txBody>
+      </p:sp>
+      <p:sp>
+        <p:nvSpPr>
+          <p:cNvPr id="19" name="Rectangle 18">
+            <a:extLst>
+              <a:ext uri="{FF2B5EF4-FFF2-40B4-BE49-F238E27FC236}">
+                <a16:creationId xmlns:a16="http://schemas.microsoft.com/office/drawing/2014/main" id="{7FC62A9F-1B0B-48E2-80DF-8B5FC3A5CE12}"/>
+              </a:ext>
+            </a:extLst>
+          </p:cNvPr>
+          <p:cNvSpPr/>
+          <p:nvPr/>
+        </p:nvSpPr>
+        <p:spPr>
+          <a:xfrm>
+            <a:off x="637933" y="4106420"/>
+            <a:ext cx="2016224" cy="254599"/>
+          </a:xfrm>
+          <a:prstGeom prst="rect">
+            <a:avLst/>
+          </a:prstGeom>
+          <a:noFill/>
+          <a:ln>
+            <a:noFill/>
+          </a:ln>
+        </p:spPr>
+        <p:style>
+          <a:lnRef idx="2">
+            <a:schemeClr val="accent1">
+              <a:shade val="50000"/>
+            </a:schemeClr>
+          </a:lnRef>
+          <a:fillRef idx="1">
+            <a:schemeClr val="accent1"/>
+          </a:fillRef>
+          <a:effectRef idx="0">
+            <a:schemeClr val="accent1"/>
+          </a:effectRef>
+          <a:fontRef idx="minor">
+            <a:schemeClr val="lt1"/>
+          </a:fontRef>
+        </p:style>
+        <p:txBody>
+          <a:bodyPr rtlCol="0" anchor="ctr"/>
+          <a:lstStyle/>
+          <a:p>
+            <a:pPr algn="ctr"/>
+            <a:r>
+              <a:rPr lang="en-US" b="1" dirty="0">
+                <a:solidFill>
+                  <a:schemeClr val="tx1"/>
+                </a:solidFill>
+              </a:rPr>
+              <a:t>Component Tree</a:t>
+            </a:r>
+          </a:p>
+        </p:txBody>
+      </p:sp>
+      <p:sp>
+        <p:nvSpPr>
+          <p:cNvPr id="20" name="Oval 19">
+            <a:extLst>
+              <a:ext uri="{FF2B5EF4-FFF2-40B4-BE49-F238E27FC236}">
+                <a16:creationId xmlns:a16="http://schemas.microsoft.com/office/drawing/2014/main" id="{FCC02853-50AB-41C0-BC2C-A03ED5B7D950}"/>
+              </a:ext>
+            </a:extLst>
+          </p:cNvPr>
+          <p:cNvSpPr/>
+          <p:nvPr/>
+        </p:nvSpPr>
+        <p:spPr>
+          <a:xfrm>
+            <a:off x="2917361" y="5839427"/>
+            <a:ext cx="334249" cy="288032"/>
+          </a:xfrm>
+          <a:prstGeom prst="ellipse">
+            <a:avLst/>
+          </a:prstGeom>
+        </p:spPr>
+        <p:style>
+          <a:lnRef idx="2">
+            <a:schemeClr val="accent1">
+              <a:shade val="50000"/>
+            </a:schemeClr>
+          </a:lnRef>
+          <a:fillRef idx="1">
+            <a:schemeClr val="accent1"/>
+          </a:fillRef>
+          <a:effectRef idx="0">
+            <a:schemeClr val="accent1"/>
+          </a:effectRef>
+          <a:fontRef idx="minor">
+            <a:schemeClr val="lt1"/>
+          </a:fontRef>
+        </p:style>
+        <p:txBody>
+          <a:bodyPr rtlCol="0" anchor="ctr"/>
+          <a:lstStyle/>
+          <a:p>
+            <a:pPr algn="ctr"/>
+            <a:r>
+              <a:rPr lang="en-US" dirty="0"/>
+              <a:t>1</a:t>
+            </a:r>
+          </a:p>
+        </p:txBody>
+      </p:sp>
+      <p:sp>
+        <p:nvSpPr>
+          <p:cNvPr id="21" name="Oval 20">
+            <a:extLst>
+              <a:ext uri="{FF2B5EF4-FFF2-40B4-BE49-F238E27FC236}">
+                <a16:creationId xmlns:a16="http://schemas.microsoft.com/office/drawing/2014/main" id="{A5D37985-F791-4C76-908A-B5E53F4272A7}"/>
+              </a:ext>
+            </a:extLst>
+          </p:cNvPr>
+          <p:cNvSpPr/>
+          <p:nvPr/>
+        </p:nvSpPr>
+        <p:spPr>
+          <a:xfrm>
+            <a:off x="635044" y="5276129"/>
+            <a:ext cx="334249" cy="288032"/>
+          </a:xfrm>
+          <a:prstGeom prst="ellipse">
+            <a:avLst/>
+          </a:prstGeom>
+        </p:spPr>
+        <p:style>
+          <a:lnRef idx="2">
+            <a:schemeClr val="accent1">
+              <a:shade val="50000"/>
+            </a:schemeClr>
+          </a:lnRef>
+          <a:fillRef idx="1">
+            <a:schemeClr val="accent1"/>
+          </a:fillRef>
+          <a:effectRef idx="0">
+            <a:schemeClr val="accent1"/>
+          </a:effectRef>
+          <a:fontRef idx="minor">
+            <a:schemeClr val="lt1"/>
+          </a:fontRef>
+        </p:style>
+        <p:txBody>
+          <a:bodyPr rtlCol="0" anchor="ctr"/>
+          <a:lstStyle/>
+          <a:p>
+            <a:pPr algn="ctr"/>
+            <a:r>
+              <a:rPr lang="en-US" dirty="0"/>
+              <a:t>2</a:t>
+            </a:r>
+          </a:p>
+        </p:txBody>
+      </p:sp>
+      <p:sp>
+        <p:nvSpPr>
+          <p:cNvPr id="22" name="Oval 21">
+            <a:extLst>
+              <a:ext uri="{FF2B5EF4-FFF2-40B4-BE49-F238E27FC236}">
+                <a16:creationId xmlns:a16="http://schemas.microsoft.com/office/drawing/2014/main" id="{74E99D2D-E0D5-4C6E-9E31-59C6CE18E2AB}"/>
+              </a:ext>
+            </a:extLst>
+          </p:cNvPr>
+          <p:cNvSpPr/>
+          <p:nvPr/>
+        </p:nvSpPr>
+        <p:spPr>
+          <a:xfrm>
+            <a:off x="5328442" y="5229808"/>
+            <a:ext cx="334249" cy="288032"/>
+          </a:xfrm>
+          <a:prstGeom prst="ellipse">
+            <a:avLst/>
+          </a:prstGeom>
+        </p:spPr>
+        <p:style>
+          <a:lnRef idx="2">
+            <a:schemeClr val="accent1">
+              <a:shade val="50000"/>
+            </a:schemeClr>
+          </a:lnRef>
+          <a:fillRef idx="1">
+            <a:schemeClr val="accent1"/>
+          </a:fillRef>
+          <a:effectRef idx="0">
+            <a:schemeClr val="accent1"/>
+          </a:effectRef>
+          <a:fontRef idx="minor">
+            <a:schemeClr val="lt1"/>
+          </a:fontRef>
+        </p:style>
+        <p:txBody>
+          <a:bodyPr rtlCol="0" anchor="ctr"/>
+          <a:lstStyle/>
+          <a:p>
+            <a:pPr algn="ctr"/>
+            <a:r>
+              <a:rPr lang="en-US" dirty="0"/>
+              <a:t>2</a:t>
+            </a:r>
+          </a:p>
+        </p:txBody>
+      </p:sp>
+    </p:spTree>
+    <p:extLst>
+      <p:ext uri="{BB962C8B-B14F-4D97-AF65-F5344CB8AC3E}">
+        <p14:creationId xmlns:p14="http://schemas.microsoft.com/office/powerpoint/2010/main" val="3485151841"/>
+      </p:ext>
+    </p:extLst>
+  </p:cSld>
+  <p:clrMapOvr>
+    <a:masterClrMapping/>
+  </p:clrMapOvr>
+</p:sld>
+</file>
+
+<file path=ppt/slides/slide36.xml><?xml version="1.0" encoding="utf-8"?>
+<p:sld xmlns:a="http://schemas.openxmlformats.org/drawingml/2006/main" xmlns:r="http://schemas.openxmlformats.org/officeDocument/2006/relationships" xmlns:p="http://schemas.openxmlformats.org/presentationml/2006/main">
+  <p:cSld>
+    <p:spTree>
+      <p:nvGrpSpPr>
+        <p:cNvPr id="1" name=""/>
+        <p:cNvGrpSpPr/>
+        <p:nvPr/>
+      </p:nvGrpSpPr>
+      <p:grpSpPr>
+        <a:xfrm>
+          <a:off x="0" y="0"/>
+          <a:ext cx="0" cy="0"/>
+          <a:chOff x="0" y="0"/>
+          <a:chExt cx="0" cy="0"/>
+        </a:xfrm>
+      </p:grpSpPr>
+      <p:sp>
+        <p:nvSpPr>
+          <p:cNvPr id="2" name="標題 1"/>
+          <p:cNvSpPr>
+            <a:spLocks noGrp="1"/>
+          </p:cNvSpPr>
+          <p:nvPr>
+            <p:ph type="ctrTitle"/>
+          </p:nvPr>
+        </p:nvSpPr>
+        <p:spPr>
+          <a:xfrm>
+            <a:off x="0" y="2130425"/>
+            <a:ext cx="9144000" cy="1470025"/>
+          </a:xfrm>
+          <a:gradFill flip="none" rotWithShape="1">
+            <a:gsLst>
+              <a:gs pos="0">
+                <a:srgbClr val="00B0F0">
+                  <a:shade val="30000"/>
+                  <a:satMod val="115000"/>
+                </a:srgbClr>
+              </a:gs>
+              <a:gs pos="50000">
+                <a:srgbClr val="00B0F0">
+                  <a:shade val="67500"/>
+                  <a:satMod val="115000"/>
+                </a:srgbClr>
+              </a:gs>
+              <a:gs pos="100000">
+                <a:srgbClr val="00B0F0">
+                  <a:shade val="100000"/>
+                  <a:satMod val="115000"/>
+                </a:srgbClr>
+              </a:gs>
+            </a:gsLst>
+            <a:path path="circle">
+              <a:fillToRect t="100000" r="100000"/>
+            </a:path>
+            <a:tileRect l="-100000" b="-100000"/>
+          </a:gradFill>
+        </p:spPr>
+        <p:txBody>
+          <a:bodyPr>
+            <a:normAutofit/>
+          </a:bodyPr>
+          <a:lstStyle/>
+          <a:p>
+            <a:r>
+              <a:rPr lang="en-US" altLang="zh-TW" sz="6000" b="1" dirty="0">
+                <a:solidFill>
+                  <a:srgbClr val="FFFF00"/>
+                </a:solidFill>
+              </a:rPr>
+              <a:t>End of Chapter</a:t>
+            </a:r>
+            <a:endParaRPr lang="zh-TW" altLang="en-US" sz="6000" b="1" dirty="0">
+              <a:solidFill>
+                <a:srgbClr val="FFFF00"/>
+              </a:solidFill>
+            </a:endParaRPr>
+          </a:p>
+        </p:txBody>
+      </p:sp>
+      <p:sp>
+        <p:nvSpPr>
+          <p:cNvPr id="5" name="日期版面配置區 4"/>
+          <p:cNvSpPr>
+            <a:spLocks noGrp="1"/>
+          </p:cNvSpPr>
+          <p:nvPr>
+            <p:ph type="dt" sz="half" idx="10"/>
+          </p:nvPr>
+        </p:nvSpPr>
+        <p:spPr/>
+        <p:txBody>
+          <a:bodyPr/>
+          <a:lstStyle/>
+          <a:p>
+            <a:fld id="{4E46BE27-E923-4EC2-B046-3272AE2A3E5C}" type="datetime1">
+              <a:rPr lang="zh-TW" altLang="en-US" smtClean="0"/>
+              <a:pPr/>
+              <a:t>2020/6/28</a:t>
+            </a:fld>
+            <a:endParaRPr lang="zh-TW" altLang="en-US"/>
+          </a:p>
+        </p:txBody>
+      </p:sp>
+      <p:sp>
+        <p:nvSpPr>
+          <p:cNvPr id="6" name="投影片編號版面配置區 5"/>
+          <p:cNvSpPr>
+            <a:spLocks noGrp="1"/>
+          </p:cNvSpPr>
+          <p:nvPr>
+            <p:ph type="sldNum" sz="quarter" idx="12"/>
+          </p:nvPr>
+        </p:nvSpPr>
+        <p:spPr/>
+        <p:txBody>
+          <a:bodyPr/>
+          <a:lstStyle/>
+          <a:p>
+            <a:fld id="{E4D7E63D-91F2-4366-A2C4-1B00C9E2590E}" type="slidenum">
+              <a:rPr lang="zh-TW" altLang="en-US" smtClean="0"/>
+              <a:pPr/>
+              <a:t>36</a:t>
+            </a:fld>
+            <a:endParaRPr lang="zh-TW" altLang="en-US"/>
+          </a:p>
+        </p:txBody>
+      </p:sp>
+    </p:spTree>
+  </p:cSld>
+  <p:clrMapOvr>
+    <a:masterClrMapping/>
+  </p:clrMapOvr>
+</p:sld>
+</file>
+
+<file path=ppt/slides/slide4.xml><?xml version="1.0" encoding="utf-8"?>
+<p:sld xmlns:a="http://schemas.openxmlformats.org/drawingml/2006/main" xmlns:r="http://schemas.openxmlformats.org/officeDocument/2006/relationships" xmlns:p="http://schemas.openxmlformats.org/presentationml/2006/main">
+  <p:cSld>
+    <p:spTree>
+      <p:nvGrpSpPr>
+        <p:cNvPr id="1" name=""/>
+        <p:cNvGrpSpPr/>
+        <p:nvPr/>
+      </p:nvGrpSpPr>
+      <p:grpSpPr>
+        <a:xfrm>
+          <a:off x="0" y="0"/>
+          <a:ext cx="0" cy="0"/>
+          <a:chOff x="0" y="0"/>
+          <a:chExt cx="0" cy="0"/>
+        </a:xfrm>
+      </p:grpSpPr>
+      <p:sp>
+        <p:nvSpPr>
+          <p:cNvPr id="2" name="標題 1"/>
+          <p:cNvSpPr>
+            <a:spLocks noGrp="1"/>
+          </p:cNvSpPr>
+          <p:nvPr>
+            <p:ph type="ctrTitle"/>
+          </p:nvPr>
+        </p:nvSpPr>
+        <p:spPr>
+          <a:xfrm>
+            <a:off x="0" y="1"/>
+            <a:ext cx="9144000" cy="764704"/>
+          </a:xfrm>
+          <a:gradFill flip="none" rotWithShape="1">
+            <a:gsLst>
+              <a:gs pos="0">
+                <a:srgbClr val="C00000">
+                  <a:shade val="30000"/>
+                  <a:satMod val="115000"/>
+                </a:srgbClr>
+              </a:gs>
+              <a:gs pos="50000">
+                <a:srgbClr val="C00000">
+                  <a:shade val="67500"/>
+                  <a:satMod val="115000"/>
+                </a:srgbClr>
+              </a:gs>
+              <a:gs pos="100000">
+                <a:srgbClr val="C00000">
+                  <a:shade val="100000"/>
+                  <a:satMod val="115000"/>
+                </a:srgbClr>
+              </a:gs>
+            </a:gsLst>
+            <a:path path="circle">
+              <a:fillToRect t="100000" r="100000"/>
+            </a:path>
+            <a:tileRect l="-100000" b="-100000"/>
+          </a:gradFill>
+        </p:spPr>
+        <p:txBody>
+          <a:bodyPr>
+            <a:normAutofit/>
+          </a:bodyPr>
+          <a:lstStyle/>
+          <a:p>
+            <a:pPr algn="l"/>
+            <a:r>
+              <a:rPr lang="en-US" altLang="zh-TW" b="1" dirty="0">
+                <a:solidFill>
+                  <a:srgbClr val="FFFF00"/>
+                </a:solidFill>
+              </a:rPr>
+              <a:t>34 Higher Order Components 2</a:t>
+            </a:r>
+            <a:endParaRPr lang="zh-TW" altLang="en-US" b="1" dirty="0">
+              <a:solidFill>
+                <a:srgbClr val="FFFF00"/>
+              </a:solidFill>
+            </a:endParaRPr>
+          </a:p>
+        </p:txBody>
+      </p:sp>
+      <p:sp>
+        <p:nvSpPr>
+          <p:cNvPr id="3" name="副標題 2"/>
+          <p:cNvSpPr>
+            <a:spLocks noGrp="1"/>
+          </p:cNvSpPr>
+          <p:nvPr>
+            <p:ph type="subTitle" idx="1"/>
+          </p:nvPr>
+        </p:nvSpPr>
+        <p:spPr>
+          <a:xfrm>
+            <a:off x="467544" y="1340768"/>
+            <a:ext cx="8352928" cy="826066"/>
+          </a:xfrm>
+          <a:ln>
+            <a:solidFill>
+              <a:srgbClr val="C00000"/>
+            </a:solidFill>
+          </a:ln>
+        </p:spPr>
+        <p:txBody>
+          <a:bodyPr>
+            <a:noAutofit/>
+          </a:bodyPr>
+          <a:lstStyle/>
+          <a:p>
+            <a:pPr marL="342900" indent="-342900" algn="l">
+              <a:buClr>
+                <a:srgbClr val="0070C0"/>
+              </a:buClr>
+              <a:buSzPct val="80000"/>
+              <a:buFont typeface="Wingdings" pitchFamily="2" charset="2"/>
+              <a:buChar char="u"/>
+            </a:pPr>
+            <a:r>
+              <a:rPr lang="en-US" altLang="zh-TW" sz="1800" b="1" dirty="0">
+                <a:solidFill>
+                  <a:srgbClr val="C00000"/>
+                </a:solidFill>
+                <a:latin typeface="+mj-lt"/>
+              </a:rPr>
+              <a:t>HOC (Higher Order Component)</a:t>
+            </a:r>
+          </a:p>
+          <a:p>
+            <a:pPr marL="342900" indent="-342900" algn="l">
+              <a:buClr>
+                <a:srgbClr val="0070C0"/>
+              </a:buClr>
+              <a:buSzPct val="80000"/>
+              <a:buFont typeface="Wingdings" pitchFamily="2" charset="2"/>
+              <a:buChar char="u"/>
+            </a:pPr>
+            <a:r>
+              <a:rPr lang="en-US" altLang="zh-TW" sz="1800" b="1" dirty="0">
+                <a:solidFill>
+                  <a:schemeClr val="tx1"/>
+                </a:solidFill>
+              </a:rPr>
+              <a:t>In simple code, it will look something like this:</a:t>
+            </a:r>
+          </a:p>
+        </p:txBody>
+      </p:sp>
+      <p:sp>
+        <p:nvSpPr>
+          <p:cNvPr id="4" name="標題 1"/>
+          <p:cNvSpPr txBox="1">
+            <a:spLocks/>
+          </p:cNvSpPr>
+          <p:nvPr/>
+        </p:nvSpPr>
+        <p:spPr>
+          <a:xfrm>
+            <a:off x="0" y="764704"/>
+            <a:ext cx="9144000" cy="398616"/>
+          </a:xfrm>
+          <a:prstGeom prst="rect">
+            <a:avLst/>
+          </a:prstGeom>
+          <a:gradFill flip="none" rotWithShape="1">
+            <a:gsLst>
+              <a:gs pos="0">
+                <a:srgbClr val="00B0F0">
+                  <a:shade val="30000"/>
+                  <a:satMod val="115000"/>
+                </a:srgbClr>
+              </a:gs>
+              <a:gs pos="50000">
+                <a:srgbClr val="00B0F0">
+                  <a:shade val="67500"/>
+                  <a:satMod val="115000"/>
+                </a:srgbClr>
+              </a:gs>
+              <a:gs pos="100000">
+                <a:srgbClr val="00B0F0">
+                  <a:shade val="100000"/>
+                  <a:satMod val="115000"/>
+                </a:srgbClr>
+              </a:gs>
+            </a:gsLst>
+            <a:path path="circle">
+              <a:fillToRect t="100000" r="100000"/>
+            </a:path>
+            <a:tileRect l="-100000" b="-100000"/>
+          </a:gradFill>
+        </p:spPr>
+        <p:txBody>
+          <a:bodyPr vert="horz" lIns="91440" tIns="45720" rIns="91440" bIns="45720" rtlCol="0" anchor="ctr">
+            <a:normAutofit fontScale="92500"/>
+          </a:bodyPr>
+          <a:lstStyle/>
+          <a:p>
+            <a:r>
+              <a:rPr lang="en-US" sz="1600" dirty="0">
+                <a:hlinkClick r:id="rId2"/>
+              </a:rPr>
+              <a:t>https://www.youtube.com/watch?v=rsBQj6X7UK8&amp;list=PLC3y8-rFHvwgg3vaYJgHGnModB54rxOk3&amp;index=34</a:t>
+            </a:r>
+            <a:endParaRPr lang="en-US" altLang="zh-TW" sz="1600" b="1" i="1" dirty="0"/>
+          </a:p>
+        </p:txBody>
+      </p:sp>
+      <p:sp>
+        <p:nvSpPr>
+          <p:cNvPr id="5" name="日期版面配置區 4"/>
+          <p:cNvSpPr>
+            <a:spLocks noGrp="1"/>
+          </p:cNvSpPr>
+          <p:nvPr>
+            <p:ph type="dt" sz="half" idx="10"/>
+          </p:nvPr>
+        </p:nvSpPr>
+        <p:spPr>
+          <a:xfrm>
+            <a:off x="457200" y="6356350"/>
+            <a:ext cx="2133600" cy="404246"/>
+          </a:xfrm>
+        </p:spPr>
+        <p:txBody>
+          <a:bodyPr/>
+          <a:lstStyle/>
+          <a:p>
+            <a:fld id="{A4F910E6-8D00-4BAF-8C48-9688E0B449D3}" type="datetime1">
+              <a:rPr lang="zh-TW" altLang="en-US" smtClean="0"/>
+              <a:pPr/>
+              <a:t>2020/6/28</a:t>
             </a:fld>
             <a:endParaRPr lang="zh-TW" altLang="en-US"/>
           </a:p>
@@ -15454,7 +16732,7 @@
                 </a:solidFill>
                 <a:latin typeface="+mj-lt"/>
               </a:rPr>
-              <a:t>Const new component is equal to a function called higher order component.</a:t>
+              <a:t>const new component is equal to a function called higher order component.</a:t>
             </a:r>
           </a:p>
           <a:p>
@@ -15757,7 +17035,7 @@
             <a:fld id="{A4F910E6-8D00-4BAF-8C48-9688E0B449D3}" type="datetime1">
               <a:rPr lang="zh-TW" altLang="en-US" smtClean="0"/>
               <a:pPr/>
-              <a:t>2020/5/24</a:t>
+              <a:t>2020/6/28</a:t>
             </a:fld>
             <a:endParaRPr lang="zh-TW" altLang="en-US"/>
           </a:p>
@@ -16447,7 +17725,7 @@
             <a:fld id="{C389EDC9-19E3-47AC-9C57-C6A24DEA81AD}" type="datetime1">
               <a:rPr lang="zh-TW" altLang="en-US" smtClean="0"/>
               <a:pPr/>
-              <a:t>2020/5/24</a:t>
+              <a:t>2020/6/28</a:t>
             </a:fld>
             <a:endParaRPr lang="zh-TW" altLang="en-US"/>
           </a:p>
@@ -16844,7 +18122,7 @@
             <a:fld id="{A4F910E6-8D00-4BAF-8C48-9688E0B449D3}" type="datetime1">
               <a:rPr lang="zh-TW" altLang="en-US" smtClean="0"/>
               <a:pPr/>
-              <a:t>2020/5/24</a:t>
+              <a:t>2020/6/28</a:t>
             </a:fld>
             <a:endParaRPr lang="zh-TW" altLang="en-US"/>
           </a:p>
@@ -17283,7 +18561,7 @@
             <a:fld id="{A4F910E6-8D00-4BAF-8C48-9688E0B449D3}" type="datetime1">
               <a:rPr lang="zh-TW" altLang="en-US" smtClean="0"/>
               <a:pPr/>
-              <a:t>2020/5/24</a:t>
+              <a:t>2020/6/28</a:t>
             </a:fld>
             <a:endParaRPr lang="zh-TW" altLang="en-US"/>
           </a:p>
@@ -17819,7 +19097,7 @@
             <a:fld id="{A4F910E6-8D00-4BAF-8C48-9688E0B449D3}" type="datetime1">
               <a:rPr lang="zh-TW" altLang="en-US" smtClean="0"/>
               <a:pPr/>
-              <a:t>2020/5/24</a:t>
+              <a:t>2020/6/28</a:t>
             </a:fld>
             <a:endParaRPr lang="zh-TW" altLang="en-US"/>
           </a:p>

</xml_diff>